<commit_message>
Move community impact image.
</commit_message>
<xml_diff>
--- a/images/draftsim_impact.pptx
+++ b/images/draftsim_impact.pptx
@@ -3904,7 +3904,7 @@
         </p:nvSpPr>
         <p:spPr>
           <a:xfrm>
-            <a:off x="5506558" y="2902879"/>
+            <a:off x="881218" y="2960558"/>
             <a:ext cx="7332949" cy="2179792"/>
           </a:xfrm>
         </p:spPr>
@@ -4013,10 +4013,10 @@
           <a:lstStyle/>
           <a:p>
             <a:r>
-              <a:rPr lang="en-US" dirty="0" smtClean="0"/>
+              <a:rPr lang="en-US" b="1" dirty="0" smtClean="0"/>
               <a:t>Community Impact</a:t>
             </a:r>
-            <a:endParaRPr lang="en-US" dirty="0"/>
+            <a:endParaRPr lang="en-US" b="1" dirty="0"/>
           </a:p>
         </p:txBody>
       </p:sp>
@@ -4028,7 +4028,7 @@
         </p:nvSpPr>
         <p:spPr>
           <a:xfrm>
-            <a:off x="5506558" y="4405151"/>
+            <a:off x="881218" y="4386456"/>
             <a:ext cx="6143189" cy="1647759"/>
           </a:xfrm>
           <a:prstGeom prst="rect">
@@ -4144,8 +4144,8 @@
         </p:blipFill>
         <p:spPr>
           <a:xfrm>
-            <a:off x="622104" y="2902879"/>
-            <a:ext cx="4795098" cy="1729530"/>
+            <a:off x="6955323" y="2806267"/>
+            <a:ext cx="4379595" cy="1579663"/>
           </a:xfrm>
           <a:prstGeom prst="rect">
             <a:avLst/>
@@ -4154,7 +4154,7 @@
       </p:pic>
       <p:pic>
         <p:nvPicPr>
-          <p:cNvPr id="16" name="Picture 15"/>
+          <p:cNvPr id="17" name="Picture 16"/>
           <p:cNvPicPr>
             <a:picLocks noChangeAspect="1"/>
           </p:cNvPicPr>
@@ -4168,8 +4168,8 @@
         </p:blipFill>
         <p:spPr>
           <a:xfrm>
-            <a:off x="622104" y="4940995"/>
-            <a:ext cx="4839444" cy="741747"/>
+            <a:off x="7024407" y="4474629"/>
+            <a:ext cx="4241426" cy="1630409"/>
           </a:xfrm>
           <a:prstGeom prst="rect">
             <a:avLst/>

</xml_diff>